<commit_message>
Back to static and json
</commit_message>
<xml_diff>
--- a/Slides/Lecture10 - XAML part II.pptx
+++ b/Slides/Lecture10 - XAML part II.pptx
@@ -336,7 +336,7 @@
               <a:rPr lang="en-US" smtClean="0">
                 <a:latin typeface="Segoe UI" pitchFamily="34" charset="0"/>
               </a:rPr>
-              <a:t>11/16/2016</a:t>
+              <a:t>11/17/2016</a:t>
             </a:fld>
             <a:endParaRPr lang="en-US" dirty="0">
               <a:latin typeface="Segoe UI" pitchFamily="34" charset="0"/>
@@ -659,7 +659,7 @@
             <a:fld id="{D51B1278-D92B-4AF3-A9C1-71DD298190CE}" type="datetimeFigureOut">
               <a:rPr lang="en-US" smtClean="0"/>
               <a:pPr/>
-              <a:t>11/16/2016</a:t>
+              <a:t>11/17/2016</a:t>
             </a:fld>
             <a:endParaRPr lang="en-US" dirty="0"/>
           </a:p>
@@ -4662,7 +4662,7 @@
         <p:spPr>
           <a:xfrm>
             <a:off x="274209" y="1212850"/>
-            <a:ext cx="8778240" cy="3120854"/>
+            <a:ext cx="8778240" cy="5490734"/>
           </a:xfrm>
         </p:spPr>
         <p:txBody>
@@ -4675,7 +4675,89 @@
                   <a:schemeClr val="bg1"/>
                 </a:solidFill>
               </a:rPr>
-              <a:t>XAML and the Universal Windows Platform</a:t>
+              <a:t>More XAML</a:t>
+            </a:r>
+          </a:p>
+          <a:p>
+            <a:r>
+              <a:rPr lang="da-DK" sz="2800" dirty="0">
+                <a:solidFill>
+                  <a:schemeClr val="bg1"/>
+                </a:solidFill>
+              </a:rPr>
+              <a:t>Back </a:t>
+            </a:r>
+            <a:r>
+              <a:rPr lang="da-DK" sz="2800" dirty="0" err="1">
+                <a:solidFill>
+                  <a:schemeClr val="bg1"/>
+                </a:solidFill>
+              </a:rPr>
+              <a:t>button</a:t>
+            </a:r>
+            <a:endParaRPr lang="da-DK" sz="2800" dirty="0">
+              <a:solidFill>
+                <a:schemeClr val="bg1"/>
+              </a:solidFill>
+            </a:endParaRPr>
+          </a:p>
+          <a:p>
+            <a:r>
+              <a:rPr lang="da-DK" sz="2800" dirty="0" err="1">
+                <a:solidFill>
+                  <a:schemeClr val="bg1"/>
+                </a:solidFill>
+              </a:rPr>
+              <a:t>Entity</a:t>
+            </a:r>
+            <a:r>
+              <a:rPr lang="da-DK" sz="2800" dirty="0">
+                <a:solidFill>
+                  <a:schemeClr val="bg1"/>
+                </a:solidFill>
+              </a:rPr>
+              <a:t> Framework Core</a:t>
+            </a:r>
+          </a:p>
+          <a:p>
+            <a:r>
+              <a:rPr lang="da-DK" sz="2800" dirty="0" err="1">
+                <a:solidFill>
+                  <a:schemeClr val="bg1"/>
+                </a:solidFill>
+              </a:rPr>
+              <a:t>Dependency</a:t>
+            </a:r>
+            <a:r>
+              <a:rPr lang="da-DK" sz="2800" dirty="0">
+                <a:solidFill>
+                  <a:schemeClr val="bg1"/>
+                </a:solidFill>
+              </a:rPr>
+              <a:t> </a:t>
+            </a:r>
+            <a:r>
+              <a:rPr lang="da-DK" sz="2800" dirty="0" err="1">
+                <a:solidFill>
+                  <a:schemeClr val="bg1"/>
+                </a:solidFill>
+              </a:rPr>
+              <a:t>injection</a:t>
+            </a:r>
+            <a:endParaRPr lang="da-DK" sz="2800" dirty="0">
+              <a:solidFill>
+                <a:schemeClr val="bg1"/>
+              </a:solidFill>
+            </a:endParaRPr>
+          </a:p>
+          <a:p>
+            <a:r>
+              <a:rPr lang="da-DK" sz="2800" dirty="0">
+                <a:solidFill>
+                  <a:schemeClr val="bg1"/>
+                </a:solidFill>
+              </a:rPr>
+              <a:t>Application Manifest</a:t>
             </a:r>
           </a:p>
           <a:p>
@@ -4704,6 +4786,21 @@
             </a:r>
           </a:p>
           <a:p>
+            <a:r>
+              <a:rPr lang="da-DK" sz="2800" b="1" dirty="0" err="1">
+                <a:solidFill>
+                  <a:schemeClr val="bg1"/>
+                </a:solidFill>
+              </a:rPr>
+              <a:t>bson</a:t>
+            </a:r>
+            <a:endParaRPr lang="da-DK" b="1" dirty="0">
+              <a:solidFill>
+                <a:schemeClr val="bg1"/>
+              </a:solidFill>
+            </a:endParaRPr>
+          </a:p>
+          <a:p>
             <a:endParaRPr lang="da-DK" dirty="0">
               <a:solidFill>
                 <a:schemeClr val="bg1"/>
@@ -4720,7 +4817,7 @@
               <a:t>Final </a:t>
             </a:r>
             <a:r>
-              <a:rPr lang="da-DK" dirty="0" err="1">
+              <a:rPr lang="da-DK">
                 <a:solidFill>
                   <a:schemeClr val="bg1"/>
                 </a:solidFill>
@@ -5011,7 +5108,7 @@
         <p:spPr>
           <a:xfrm>
             <a:off x="274209" y="1212850"/>
-            <a:ext cx="8778240" cy="4339650"/>
+            <a:ext cx="8778240" cy="5558445"/>
           </a:xfrm>
         </p:spPr>
         <p:txBody>
@@ -5097,7 +5194,53 @@
                   <a:schemeClr val="bg1"/>
                 </a:solidFill>
               </a:rPr>
-              <a:t>IDisposable</a:t>
+              <a:t>Idisposable</a:t>
+            </a:r>
+            <a:endParaRPr lang="da-DK" dirty="0">
+              <a:solidFill>
+                <a:schemeClr val="bg1"/>
+              </a:solidFill>
+            </a:endParaRPr>
+          </a:p>
+          <a:p>
+            <a:r>
+              <a:rPr lang="da-DK" dirty="0" err="1">
+                <a:solidFill>
+                  <a:schemeClr val="bg1"/>
+                </a:solidFill>
+              </a:rPr>
+              <a:t>Settings</a:t>
+            </a:r>
+            <a:r>
+              <a:rPr lang="da-DK" dirty="0">
+                <a:solidFill>
+                  <a:schemeClr val="bg1"/>
+                </a:solidFill>
+              </a:rPr>
+              <a:t> and </a:t>
+            </a:r>
+            <a:r>
+              <a:rPr lang="da-DK" dirty="0" err="1">
+                <a:solidFill>
+                  <a:schemeClr val="bg1"/>
+                </a:solidFill>
+              </a:rPr>
+              <a:t>secrets</a:t>
+            </a:r>
+            <a:endParaRPr lang="da-DK" dirty="0">
+              <a:solidFill>
+                <a:schemeClr val="bg1"/>
+              </a:solidFill>
+            </a:endParaRPr>
+          </a:p>
+          <a:p>
+            <a:r>
+              <a:rPr lang="da-DK" dirty="0" err="1">
+                <a:solidFill>
+                  <a:schemeClr val="bg1"/>
+                </a:solidFill>
+              </a:rPr>
+              <a:t>Logging</a:t>
             </a:r>
             <a:endParaRPr lang="da-DK" dirty="0">
               <a:solidFill>

</xml_diff>